<commit_message>
updated presentation with persistence package updated play field xmls to correct url (https) updated uml
</commit_message>
<xml_diff>
--- a/doc/presentation/presentation.pptx
+++ b/doc/presentation/presentation.pptx
@@ -231,7 +231,7 @@
             <a:fld id="{B9DCE77F-B2F6-4C56-A9FE-A47B2C49451F}" type="datetimeFigureOut">
               <a:rPr lang="de-CH" smtClean="0"/>
               <a:pPr/>
-              <a:t>1/15/13</a:t>
+              <a:t>1/16/13</a:t>
             </a:fld>
             <a:endParaRPr lang="de-CH"/>
           </a:p>
@@ -1903,7 +1903,7 @@
       </p:grpSpPr>
       <p:pic>
         <p:nvPicPr>
-          <p:cNvPr id="9" name="Bild 8" descr="Screen Shot 2013-01-15 at 10.38.34 AM.png"/>
+          <p:cNvPr id="9" name="Bild 8"/>
           <p:cNvPicPr>
             <a:picLocks noChangeAspect="1"/>
           </p:cNvPicPr>
@@ -1923,8 +1923,8 @@
         </p:blipFill>
         <p:spPr>
           <a:xfrm>
-            <a:off x="1738872" y="1800485"/>
-            <a:ext cx="5890006" cy="4378412"/>
+            <a:off x="1738872" y="1863803"/>
+            <a:ext cx="5890006" cy="4251776"/>
           </a:xfrm>
           <a:prstGeom prst="rect">
             <a:avLst/>
@@ -1962,7 +1962,7 @@
         </p:nvSpPr>
         <p:spPr>
           <a:xfrm rot="10800000" flipV="1">
-            <a:off x="4986474" y="3076885"/>
+            <a:off x="4830500" y="3076885"/>
             <a:ext cx="3162362" cy="3251346"/>
           </a:xfrm>
           <a:prstGeom prst="corner">
@@ -2113,7 +2113,7 @@
       </p:grpSpPr>
       <p:pic>
         <p:nvPicPr>
-          <p:cNvPr id="9" name="Bild 8" descr="Screen Shot 2013-01-15 at 10.38.34 AM.png"/>
+          <p:cNvPr id="9" name="Bild 8"/>
           <p:cNvPicPr>
             <a:picLocks noChangeAspect="1"/>
           </p:cNvPicPr>
@@ -2133,8 +2133,8 @@
         </p:blipFill>
         <p:spPr>
           <a:xfrm>
-            <a:off x="1738872" y="1800485"/>
-            <a:ext cx="5890006" cy="4378412"/>
+            <a:off x="1738872" y="1863803"/>
+            <a:ext cx="5890006" cy="4251776"/>
           </a:xfrm>
           <a:prstGeom prst="rect">
             <a:avLst/>
@@ -2172,7 +2172,7 @@
         </p:nvSpPr>
         <p:spPr>
           <a:xfrm>
-            <a:off x="5881482" y="2701859"/>
+            <a:off x="5779512" y="2701859"/>
             <a:ext cx="3102696" cy="2650726"/>
           </a:xfrm>
           <a:prstGeom prst="rect">
@@ -2217,7 +2217,7 @@
         </p:nvSpPr>
         <p:spPr>
           <a:xfrm>
-            <a:off x="7258394" y="4571124"/>
+            <a:off x="7356602" y="2701859"/>
             <a:ext cx="1525606" cy="707886"/>
           </a:xfrm>
           <a:prstGeom prst="rect">
@@ -2273,7 +2273,7 @@
         </p:nvSpPr>
         <p:spPr>
           <a:xfrm rot="16200000">
-            <a:off x="2397380" y="2124199"/>
+            <a:off x="2295410" y="2124199"/>
             <a:ext cx="2650726" cy="3806045"/>
           </a:xfrm>
           <a:prstGeom prst="corner">
@@ -2321,7 +2321,7 @@
         </p:nvSpPr>
         <p:spPr>
           <a:xfrm>
-            <a:off x="1933893" y="4571124"/>
+            <a:off x="1738872" y="4561263"/>
             <a:ext cx="2404766" cy="707886"/>
           </a:xfrm>
           <a:prstGeom prst="rect">
@@ -2411,7 +2411,7 @@
       </p:grpSpPr>
       <p:pic>
         <p:nvPicPr>
-          <p:cNvPr id="9" name="Bild 8" descr="Screen Shot 2013-01-15 at 10.38.34 AM.png"/>
+          <p:cNvPr id="9" name="Bild 8"/>
           <p:cNvPicPr>
             <a:picLocks noChangeAspect="1"/>
           </p:cNvPicPr>
@@ -2431,8 +2431,8 @@
         </p:blipFill>
         <p:spPr>
           <a:xfrm>
-            <a:off x="1738872" y="1800485"/>
-            <a:ext cx="5890006" cy="4378412"/>
+            <a:off x="1738872" y="1863803"/>
+            <a:ext cx="5890006" cy="4251776"/>
           </a:xfrm>
           <a:prstGeom prst="rect">
             <a:avLst/>
@@ -3621,7 +3621,7 @@
       </p:sp>
       <p:pic>
         <p:nvPicPr>
-          <p:cNvPr id="6" name="Bild 5" descr="Screen Shot 2013-01-15 at 6.12.10 PM.png"/>
+          <p:cNvPr id="6" name="Bild 5"/>
           <p:cNvPicPr>
             <a:picLocks noChangeAspect="1"/>
           </p:cNvPicPr>
@@ -3641,8 +3641,8 @@
         </p:blipFill>
         <p:spPr>
           <a:xfrm>
-            <a:off x="1748856" y="1777881"/>
-            <a:ext cx="6984000" cy="3144312"/>
+            <a:off x="1783603" y="1777881"/>
+            <a:ext cx="6914506" cy="3144312"/>
           </a:xfrm>
           <a:prstGeom prst="rect">
             <a:avLst/>
@@ -3739,14 +3739,7 @@
                 <a:latin typeface="Consolas"/>
                 <a:cs typeface="Consolas"/>
               </a:rPr>
-              <a:t>SimulationStore</a:t>
-            </a:r>
-            <a:r>
-              <a:rPr lang="de-DE" dirty="0" err="1" smtClean="0">
-                <a:latin typeface="Consolas"/>
-                <a:cs typeface="Consolas"/>
-              </a:rPr>
-              <a:t>Pdo</a:t>
+              <a:t>SimulationStorePdo</a:t>
             </a:r>
             <a:endParaRPr lang="de-DE" dirty="0">
               <a:latin typeface="Consolas"/>
@@ -4206,7 +4199,7 @@
       </p:sp>
       <p:pic>
         <p:nvPicPr>
-          <p:cNvPr id="3" name="Bild 2" descr="Screen Shot 2013-01-15 at 7.01.21 PM.png"/>
+          <p:cNvPr id="3" name="Bild 2"/>
           <p:cNvPicPr>
             <a:picLocks noChangeAspect="1"/>
           </p:cNvPicPr>
@@ -4226,8 +4219,8 @@
         </p:blipFill>
         <p:spPr>
           <a:xfrm>
-            <a:off x="1775888" y="1861724"/>
-            <a:ext cx="3271949" cy="4181275"/>
+            <a:off x="1794499" y="1861724"/>
+            <a:ext cx="3146575" cy="4067329"/>
           </a:xfrm>
           <a:prstGeom prst="rect">
             <a:avLst/>
@@ -4392,7 +4385,6 @@
               <a:rPr lang="de-DE" dirty="0" smtClean="0"/>
               <a:t>Communication</a:t>
             </a:r>
-            <a:endParaRPr lang="de-DE" dirty="0" smtClean="0"/>
           </a:p>
           <a:p>
             <a:pPr lvl="2"/>
@@ -4516,7 +4508,7 @@
       </p:sp>
       <p:pic>
         <p:nvPicPr>
-          <p:cNvPr id="4" name="Bild 3" descr="Screen Shot 2013-01-15 at 7.03.30 PM.png"/>
+          <p:cNvPr id="4" name="Bild 3"/>
           <p:cNvPicPr>
             <a:picLocks noChangeAspect="1"/>
           </p:cNvPicPr>
@@ -4536,8 +4528,8 @@
         </p:blipFill>
         <p:spPr>
           <a:xfrm>
-            <a:off x="1800000" y="1861724"/>
-            <a:ext cx="6698316" cy="4377719"/>
+            <a:off x="120515" y="1943766"/>
+            <a:ext cx="8899616" cy="4243466"/>
           </a:xfrm>
           <a:prstGeom prst="rect">
             <a:avLst/>
@@ -4610,7 +4602,7 @@
       </p:sp>
       <p:pic>
         <p:nvPicPr>
-          <p:cNvPr id="3" name="Bild 2" descr="Screen Shot 2013-01-15 at 7.13.04 PM.png"/>
+          <p:cNvPr id="3" name="Bild 2"/>
           <p:cNvPicPr>
             <a:picLocks noChangeAspect="1"/>
           </p:cNvPicPr>
@@ -4630,8 +4622,8 @@
         </p:blipFill>
         <p:spPr>
           <a:xfrm>
-            <a:off x="1800000" y="1861724"/>
-            <a:ext cx="6708625" cy="4147150"/>
+            <a:off x="843597" y="1933399"/>
+            <a:ext cx="7611045" cy="4542376"/>
           </a:xfrm>
           <a:prstGeom prst="rect">
             <a:avLst/>
@@ -7853,28 +7845,191 @@
                 <a:latin typeface="Arial"/>
                 <a:cs typeface="Arial"/>
               </a:rPr>
+              <a:t> http</a:t>
+            </a:r>
+            <a:r>
+              <a:rPr lang="de-DE" sz="800" dirty="0">
+                <a:latin typeface="Arial"/>
+                <a:cs typeface="Arial"/>
+              </a:rPr>
+              <a:t>://</a:t>
+            </a:r>
+            <a:r>
+              <a:rPr lang="de-DE" sz="800" dirty="0" err="1">
+                <a:latin typeface="Arial"/>
+                <a:cs typeface="Arial"/>
+              </a:rPr>
+              <a:t>astah.net</a:t>
+            </a:r>
+            <a:r>
+              <a:rPr lang="de-DE" sz="800" dirty="0">
+                <a:latin typeface="Arial"/>
+                <a:cs typeface="Arial"/>
+              </a:rPr>
+              <a:t>/</a:t>
+            </a:r>
+            <a:r>
+              <a:rPr lang="de-DE" sz="800" dirty="0" err="1">
+                <a:latin typeface="Arial"/>
+                <a:cs typeface="Arial"/>
+              </a:rPr>
+              <a:t>resources</a:t>
+            </a:r>
+            <a:r>
+              <a:rPr lang="de-DE" sz="800" dirty="0">
+                <a:latin typeface="Arial"/>
+                <a:cs typeface="Arial"/>
+              </a:rPr>
+              <a:t>/</a:t>
+            </a:r>
+            <a:r>
+              <a:rPr lang="de-DE" sz="800" dirty="0" err="1">
+                <a:latin typeface="Arial"/>
+                <a:cs typeface="Arial"/>
+              </a:rPr>
+              <a:t>images</a:t>
+            </a:r>
+            <a:r>
+              <a:rPr lang="de-DE" sz="800" dirty="0">
+                <a:latin typeface="Arial"/>
+                <a:cs typeface="Arial"/>
+              </a:rPr>
+              <a:t>/</a:t>
+            </a:r>
+            <a:r>
+              <a:rPr lang="de-DE" sz="800" dirty="0" err="1">
+                <a:latin typeface="Arial"/>
+                <a:cs typeface="Arial"/>
+              </a:rPr>
+              <a:t>logos</a:t>
+            </a:r>
+            <a:r>
+              <a:rPr lang="de-DE" sz="800" dirty="0">
+                <a:latin typeface="Arial"/>
+                <a:cs typeface="Arial"/>
+              </a:rPr>
+              <a:t>/</a:t>
+            </a:r>
+            <a:r>
+              <a:rPr lang="de-DE" sz="800" dirty="0" err="1" smtClean="0">
+                <a:latin typeface="Arial"/>
+                <a:cs typeface="Arial"/>
+              </a:rPr>
+              <a:t>AstahCommunity.png</a:t>
+            </a:r>
+            <a:r>
+              <a:rPr lang="de-DE" sz="800" dirty="0" smtClean="0">
+                <a:latin typeface="Arial"/>
+                <a:cs typeface="Arial"/>
+              </a:rPr>
               <a:t> </a:t>
             </a:r>
             <a:r>
+              <a:rPr lang="de-DE" sz="800" dirty="0">
+                <a:latin typeface="Arial"/>
+                <a:cs typeface="Arial"/>
+              </a:rPr>
+              <a:t>http://</a:t>
+            </a:r>
+            <a:r>
+              <a:rPr lang="de-DE" sz="800" dirty="0" err="1">
+                <a:latin typeface="Arial"/>
+                <a:cs typeface="Arial"/>
+              </a:rPr>
+              <a:t>maven.apache.org</a:t>
+            </a:r>
+            <a:r>
+              <a:rPr lang="de-DE" sz="800" dirty="0">
+                <a:latin typeface="Arial"/>
+                <a:cs typeface="Arial"/>
+              </a:rPr>
+              <a:t>/</a:t>
+            </a:r>
+            <a:r>
+              <a:rPr lang="de-DE" sz="800" dirty="0" err="1">
+                <a:latin typeface="Arial"/>
+                <a:cs typeface="Arial"/>
+              </a:rPr>
+              <a:t>images</a:t>
+            </a:r>
+            <a:r>
+              <a:rPr lang="de-DE" sz="800" dirty="0">
+                <a:latin typeface="Arial"/>
+                <a:cs typeface="Arial"/>
+              </a:rPr>
+              <a:t>/maven-logo-2.</a:t>
+            </a:r>
+            <a:r>
               <a:rPr lang="de-DE" sz="800" dirty="0" smtClean="0">
                 <a:latin typeface="Arial"/>
                 <a:cs typeface="Arial"/>
               </a:rPr>
-              <a:t>http</a:t>
+              <a:t>gif</a:t>
+            </a:r>
+          </a:p>
+          <a:p>
+            <a:r>
+              <a:rPr lang="de-DE" sz="800" dirty="0" smtClean="0">
+                <a:latin typeface="Arial"/>
+                <a:cs typeface="Arial"/>
+              </a:rPr>
+              <a:t>http://</a:t>
+            </a:r>
+            <a:r>
+              <a:rPr lang="de-DE" sz="800" dirty="0" err="1" smtClean="0">
+                <a:latin typeface="Arial"/>
+                <a:cs typeface="Arial"/>
+              </a:rPr>
+              <a:t>www.redmine.org</a:t>
+            </a:r>
+            <a:r>
+              <a:rPr lang="de-DE" sz="800" dirty="0" smtClean="0">
+                <a:latin typeface="Arial"/>
+                <a:cs typeface="Arial"/>
+              </a:rPr>
+              <a:t>/</a:t>
+            </a:r>
+            <a:r>
+              <a:rPr lang="de-DE" sz="800" dirty="0" err="1" smtClean="0">
+                <a:latin typeface="Arial"/>
+                <a:cs typeface="Arial"/>
+              </a:rPr>
+              <a:t>boards</a:t>
+            </a:r>
+            <a:r>
+              <a:rPr lang="de-DE" sz="800" dirty="0" smtClean="0">
+                <a:latin typeface="Arial"/>
+                <a:cs typeface="Arial"/>
+              </a:rPr>
+              <a:t>/1/</a:t>
+            </a:r>
+            <a:r>
+              <a:rPr lang="de-DE" sz="800" dirty="0" err="1" smtClean="0">
+                <a:latin typeface="Arial"/>
+                <a:cs typeface="Arial"/>
+              </a:rPr>
+              <a:t>topics</a:t>
+            </a:r>
+            <a:r>
+              <a:rPr lang="de-DE" sz="800" dirty="0" smtClean="0">
+                <a:latin typeface="Arial"/>
+                <a:cs typeface="Arial"/>
+              </a:rPr>
+              <a:t>/1183?page</a:t>
             </a:r>
             <a:r>
               <a:rPr lang="de-DE" sz="800" dirty="0">
                 <a:latin typeface="Arial"/>
                 <a:cs typeface="Arial"/>
               </a:rPr>
-              <a:t>://</a:t>
+              <a:t>=2 http://</a:t>
             </a:r>
             <a:r>
               <a:rPr lang="de-DE" sz="800" dirty="0" err="1">
                 <a:latin typeface="Arial"/>
                 <a:cs typeface="Arial"/>
               </a:rPr>
-              <a:t>astah.net</a:t>
+              <a:t>git-scm.com</a:t>
             </a:r>
             <a:r>
               <a:rPr lang="de-DE" sz="800" dirty="0">
@@ -7888,38 +8043,59 @@
                 <a:latin typeface="Arial"/>
                 <a:cs typeface="Arial"/>
               </a:rPr>
-              <a:t>resources</a:t>
+              <a:t>images</a:t>
             </a:r>
             <a:r>
               <a:rPr lang="de-DE" sz="800" dirty="0">
                 <a:latin typeface="Arial"/>
                 <a:cs typeface="Arial"/>
               </a:rPr>
+              <a:t>/logo@2x.png </a:t>
+            </a:r>
+            <a:r>
+              <a:rPr lang="de-DE" sz="800" dirty="0" smtClean="0">
+                <a:latin typeface="Arial"/>
+                <a:cs typeface="Arial"/>
+              </a:rPr>
+              <a:t>http://</a:t>
+            </a:r>
+            <a:r>
+              <a:rPr lang="de-DE" sz="800" dirty="0" err="1" smtClean="0">
+                <a:latin typeface="Arial"/>
+                <a:cs typeface="Arial"/>
+              </a:rPr>
+              <a:t>upload.wikimedia.org</a:t>
+            </a:r>
+            <a:r>
+              <a:rPr lang="de-DE" sz="800" dirty="0" smtClean="0">
+                <a:latin typeface="Arial"/>
+                <a:cs typeface="Arial"/>
+              </a:rPr>
               <a:t>/</a:t>
             </a:r>
             <a:r>
-              <a:rPr lang="de-DE" sz="800" dirty="0" err="1">
-                <a:latin typeface="Arial"/>
-                <a:cs typeface="Arial"/>
-              </a:rPr>
-              <a:t>images</a:t>
-            </a:r>
-            <a:r>
-              <a:rPr lang="de-DE" sz="800" dirty="0">
+              <a:rPr lang="de-DE" sz="800" dirty="0" err="1" smtClean="0">
+                <a:latin typeface="Arial"/>
+                <a:cs typeface="Arial"/>
+              </a:rPr>
+              <a:t>wikipedia</a:t>
+            </a:r>
+            <a:r>
+              <a:rPr lang="de-DE" sz="800" dirty="0" smtClean="0">
                 <a:latin typeface="Arial"/>
                 <a:cs typeface="Arial"/>
               </a:rPr>
               <a:t>/</a:t>
             </a:r>
             <a:r>
-              <a:rPr lang="de-DE" sz="800" dirty="0" err="1">
-                <a:latin typeface="Arial"/>
-                <a:cs typeface="Arial"/>
-              </a:rPr>
-              <a:t>logos</a:t>
-            </a:r>
-            <a:r>
-              <a:rPr lang="de-DE" sz="800" dirty="0">
+              <a:rPr lang="de-DE" sz="800" dirty="0" err="1" smtClean="0">
+                <a:latin typeface="Arial"/>
+                <a:cs typeface="Arial"/>
+              </a:rPr>
+              <a:t>commons</a:t>
+            </a:r>
+            <a:r>
+              <a:rPr lang="de-DE" sz="800" dirty="0" smtClean="0">
                 <a:latin typeface="Arial"/>
                 <a:cs typeface="Arial"/>
               </a:rPr>
@@ -7930,235 +8106,29 @@
                 <a:latin typeface="Arial"/>
                 <a:cs typeface="Arial"/>
               </a:rPr>
-              <a:t>AstahCommunity.png</a:t>
+              <a:t>thumb</a:t>
             </a:r>
             <a:r>
               <a:rPr lang="de-DE" sz="800" dirty="0" smtClean="0">
                 <a:latin typeface="Arial"/>
                 <a:cs typeface="Arial"/>
               </a:rPr>
-              <a:t> </a:t>
-            </a:r>
-            <a:r>
-              <a:rPr lang="de-DE" sz="800" dirty="0">
-                <a:latin typeface="Arial"/>
-                <a:cs typeface="Arial"/>
-              </a:rPr>
-              <a:t>http://</a:t>
-            </a:r>
-            <a:r>
-              <a:rPr lang="de-DE" sz="800" dirty="0" err="1">
-                <a:latin typeface="Arial"/>
-                <a:cs typeface="Arial"/>
-              </a:rPr>
-              <a:t>maven.apache.org</a:t>
-            </a:r>
-            <a:r>
-              <a:rPr lang="de-DE" sz="800" dirty="0">
-                <a:latin typeface="Arial"/>
-                <a:cs typeface="Arial"/>
-              </a:rPr>
-              <a:t>/</a:t>
-            </a:r>
-            <a:r>
-              <a:rPr lang="de-DE" sz="800" dirty="0" err="1">
-                <a:latin typeface="Arial"/>
-                <a:cs typeface="Arial"/>
-              </a:rPr>
-              <a:t>images</a:t>
-            </a:r>
-            <a:r>
-              <a:rPr lang="de-DE" sz="800" dirty="0">
-                <a:latin typeface="Arial"/>
-                <a:cs typeface="Arial"/>
-              </a:rPr>
-              <a:t>/maven-logo-2.</a:t>
+              <a:t>/b/b3/</a:t>
+            </a:r>
+            <a:r>
+              <a:rPr lang="de-DE" sz="800" dirty="0" err="1" smtClean="0">
+                <a:latin typeface="Arial"/>
+                <a:cs typeface="Arial"/>
+              </a:rPr>
+              <a:t>GitHub.svg</a:t>
             </a:r>
             <a:r>
               <a:rPr lang="de-DE" sz="800" dirty="0" smtClean="0">
                 <a:latin typeface="Arial"/>
                 <a:cs typeface="Arial"/>
               </a:rPr>
-              <a:t>gif</a:t>
-            </a:r>
-            <a:endParaRPr lang="de-DE" sz="800" dirty="0" smtClean="0">
-              <a:latin typeface="Arial"/>
-              <a:cs typeface="Arial"/>
-            </a:endParaRPr>
-          </a:p>
-          <a:p>
-            <a:r>
-              <a:rPr lang="de-DE" sz="800" dirty="0" smtClean="0">
-                <a:latin typeface="Arial"/>
-                <a:cs typeface="Arial"/>
-              </a:rPr>
-              <a:t>http://</a:t>
-            </a:r>
-            <a:r>
-              <a:rPr lang="de-DE" sz="800" dirty="0" err="1" smtClean="0">
-                <a:latin typeface="Arial"/>
-                <a:cs typeface="Arial"/>
-              </a:rPr>
-              <a:t>www.redmine.org</a:t>
-            </a:r>
-            <a:r>
-              <a:rPr lang="de-DE" sz="800" dirty="0" smtClean="0">
-                <a:latin typeface="Arial"/>
-                <a:cs typeface="Arial"/>
-              </a:rPr>
-              <a:t>/</a:t>
-            </a:r>
-            <a:r>
-              <a:rPr lang="de-DE" sz="800" dirty="0" err="1" smtClean="0">
-                <a:latin typeface="Arial"/>
-                <a:cs typeface="Arial"/>
-              </a:rPr>
-              <a:t>boards</a:t>
-            </a:r>
-            <a:r>
-              <a:rPr lang="de-DE" sz="800" dirty="0" smtClean="0">
-                <a:latin typeface="Arial"/>
-                <a:cs typeface="Arial"/>
-              </a:rPr>
-              <a:t>/1/</a:t>
-            </a:r>
-            <a:r>
-              <a:rPr lang="de-DE" sz="800" dirty="0" err="1" smtClean="0">
-                <a:latin typeface="Arial"/>
-                <a:cs typeface="Arial"/>
-              </a:rPr>
-              <a:t>topics</a:t>
-            </a:r>
-            <a:r>
-              <a:rPr lang="de-DE" sz="800" dirty="0" smtClean="0">
-                <a:latin typeface="Arial"/>
-                <a:cs typeface="Arial"/>
-              </a:rPr>
-              <a:t>/1183?page</a:t>
-            </a:r>
-            <a:r>
-              <a:rPr lang="de-DE" sz="800" dirty="0">
-                <a:latin typeface="Arial"/>
-                <a:cs typeface="Arial"/>
-              </a:rPr>
-              <a:t>=2 http://</a:t>
-            </a:r>
-            <a:r>
-              <a:rPr lang="de-DE" sz="800" dirty="0" err="1">
-                <a:latin typeface="Arial"/>
-                <a:cs typeface="Arial"/>
-              </a:rPr>
-              <a:t>git-scm.com</a:t>
-            </a:r>
-            <a:r>
-              <a:rPr lang="de-DE" sz="800" dirty="0">
-                <a:latin typeface="Arial"/>
-                <a:cs typeface="Arial"/>
-              </a:rPr>
-              <a:t>/</a:t>
-            </a:r>
-            <a:r>
-              <a:rPr lang="de-DE" sz="800" dirty="0" err="1">
-                <a:latin typeface="Arial"/>
-                <a:cs typeface="Arial"/>
-              </a:rPr>
-              <a:t>images</a:t>
-            </a:r>
-            <a:r>
-              <a:rPr lang="de-DE" sz="800" dirty="0">
-                <a:latin typeface="Arial"/>
-                <a:cs typeface="Arial"/>
-              </a:rPr>
-              <a:t>/logo@2x.png </a:t>
-            </a:r>
-            <a:r>
-              <a:rPr lang="de-DE" sz="800" dirty="0" smtClean="0">
-                <a:latin typeface="Arial"/>
-                <a:cs typeface="Arial"/>
-              </a:rPr>
-              <a:t>http://</a:t>
-            </a:r>
-            <a:r>
-              <a:rPr lang="de-DE" sz="800" dirty="0" err="1" smtClean="0">
-                <a:latin typeface="Arial"/>
-                <a:cs typeface="Arial"/>
-              </a:rPr>
-              <a:t>upload.wikimedia.org</a:t>
-            </a:r>
-            <a:r>
-              <a:rPr lang="de-DE" sz="800" dirty="0" smtClean="0">
-                <a:latin typeface="Arial"/>
-                <a:cs typeface="Arial"/>
-              </a:rPr>
-              <a:t>/</a:t>
-            </a:r>
-            <a:r>
-              <a:rPr lang="de-DE" sz="800" dirty="0" err="1" smtClean="0">
-                <a:latin typeface="Arial"/>
-                <a:cs typeface="Arial"/>
-              </a:rPr>
-              <a:t>wikipedia</a:t>
-            </a:r>
-            <a:r>
-              <a:rPr lang="de-DE" sz="800" dirty="0" smtClean="0">
-                <a:latin typeface="Arial"/>
-                <a:cs typeface="Arial"/>
-              </a:rPr>
-              <a:t>/</a:t>
-            </a:r>
-            <a:r>
-              <a:rPr lang="de-DE" sz="800" dirty="0" err="1" smtClean="0">
-                <a:latin typeface="Arial"/>
-                <a:cs typeface="Arial"/>
-              </a:rPr>
-              <a:t>commons</a:t>
-            </a:r>
-            <a:r>
-              <a:rPr lang="de-DE" sz="800" dirty="0" smtClean="0">
-                <a:latin typeface="Arial"/>
-                <a:cs typeface="Arial"/>
-              </a:rPr>
-              <a:t>/</a:t>
-            </a:r>
-            <a:r>
-              <a:rPr lang="de-DE" sz="800" dirty="0" err="1" smtClean="0">
-                <a:latin typeface="Arial"/>
-                <a:cs typeface="Arial"/>
-              </a:rPr>
-              <a:t>thumb</a:t>
-            </a:r>
-            <a:r>
-              <a:rPr lang="de-DE" sz="800" dirty="0" smtClean="0">
-                <a:latin typeface="Arial"/>
-                <a:cs typeface="Arial"/>
-              </a:rPr>
-              <a:t>/b/b3/</a:t>
-            </a:r>
-            <a:r>
-              <a:rPr lang="de-DE" sz="800" dirty="0" err="1" smtClean="0">
-                <a:latin typeface="Arial"/>
-                <a:cs typeface="Arial"/>
-              </a:rPr>
-              <a:t>GitHub.svg</a:t>
-            </a:r>
-            <a:r>
-              <a:rPr lang="de-DE" sz="800" dirty="0" smtClean="0">
-                <a:latin typeface="Arial"/>
-                <a:cs typeface="Arial"/>
-              </a:rPr>
-              <a:t>/500px-</a:t>
-            </a:r>
-            <a:r>
-              <a:rPr lang="de-DE" sz="800" dirty="0" smtClean="0">
-                <a:latin typeface="Arial"/>
-                <a:cs typeface="Arial"/>
-              </a:rPr>
-              <a:t>GitHub.svg.png</a:t>
-            </a:r>
-            <a:endParaRPr lang="de-DE" sz="800" dirty="0" smtClean="0">
-              <a:latin typeface="Arial"/>
-              <a:cs typeface="Arial"/>
-            </a:endParaRPr>
+              <a:t>/500px-GitHub.svg.png</a:t>
+            </a:r>
           </a:p>
           <a:p>
             <a:r>
@@ -8857,14 +8827,7 @@
                 <a:latin typeface="Arial"/>
                 <a:cs typeface="Arial"/>
               </a:rPr>
-              <a:t>logo.jpg </a:t>
-            </a:r>
-            <a:r>
-              <a:rPr lang="de-DE" sz="800" dirty="0" smtClean="0">
-                <a:latin typeface="Arial"/>
-                <a:cs typeface="Arial"/>
-              </a:rPr>
-              <a:t>http</a:t>
+              <a:t>logo.jpg http</a:t>
             </a:r>
             <a:r>
               <a:rPr lang="de-DE" sz="800" dirty="0">
@@ -9248,7 +9211,6 @@
               <a:rPr lang="de-DE" dirty="0" smtClean="0"/>
               <a:t> (Box2D)</a:t>
             </a:r>
-            <a:endParaRPr lang="de-DE" dirty="0" smtClean="0"/>
           </a:p>
           <a:p>
             <a:pPr lvl="2"/>
@@ -9258,17 +9220,8 @@
             </a:r>
             <a:r>
               <a:rPr lang="de-DE" dirty="0" smtClean="0"/>
-              <a:t> (XML, </a:t>
-            </a:r>
-            <a:r>
-              <a:rPr lang="de-DE" dirty="0" smtClean="0"/>
-              <a:t>JAXB</a:t>
-            </a:r>
-            <a:r>
-              <a:rPr lang="de-DE" dirty="0" smtClean="0"/>
-              <a:t>)</a:t>
-            </a:r>
-            <a:endParaRPr lang="de-DE" dirty="0" smtClean="0"/>
+              <a:t> (XML, JAXB)</a:t>
+            </a:r>
           </a:p>
           <a:p>
             <a:pPr lvl="2"/>
@@ -9307,7 +9260,6 @@
               <a:rPr lang="de-DE" dirty="0" smtClean="0"/>
               <a:t>)</a:t>
             </a:r>
-            <a:endParaRPr lang="de-DE" dirty="0" smtClean="0"/>
           </a:p>
           <a:p>
             <a:pPr lvl="2"/>
@@ -9319,7 +9271,6 @@
               <a:rPr lang="de-DE" dirty="0" smtClean="0"/>
               <a:t> (Java)</a:t>
             </a:r>
-            <a:endParaRPr lang="de-DE" dirty="0" smtClean="0"/>
           </a:p>
           <a:p>
             <a:pPr lvl="2"/>
@@ -10308,10 +10259,6 @@
               </a:rPr>
               <a:t> </a:t>
             </a:r>
-            <a:endParaRPr lang="de-DE" sz="800" dirty="0">
-              <a:latin typeface="Arial"/>
-              <a:cs typeface="Arial"/>
-            </a:endParaRPr>
           </a:p>
         </p:txBody>
       </p:sp>
@@ -10554,7 +10501,7 @@
       </p:grpSpPr>
       <p:pic>
         <p:nvPicPr>
-          <p:cNvPr id="9" name="Bild 8" descr="Screen Shot 2013-01-15 at 10.38.34 AM.png"/>
+          <p:cNvPr id="9" name="Bild 8"/>
           <p:cNvPicPr>
             <a:picLocks noChangeAspect="1"/>
           </p:cNvPicPr>
@@ -10574,8 +10521,8 @@
         </p:blipFill>
         <p:spPr>
           <a:xfrm>
-            <a:off x="1738872" y="1800485"/>
-            <a:ext cx="5890006" cy="4378412"/>
+            <a:off x="1738872" y="1863803"/>
+            <a:ext cx="5890006" cy="4251776"/>
           </a:xfrm>
           <a:prstGeom prst="rect">
             <a:avLst/>
@@ -10644,7 +10591,7 @@
       </p:grpSpPr>
       <p:pic>
         <p:nvPicPr>
-          <p:cNvPr id="10" name="Bild 9" descr="Screen Shot 2013-01-15 at 10.38.34 AM.png"/>
+          <p:cNvPr id="10" name="Bild 9"/>
           <p:cNvPicPr>
             <a:picLocks noChangeAspect="1"/>
           </p:cNvPicPr>
@@ -10664,8 +10611,8 @@
         </p:blipFill>
         <p:spPr>
           <a:xfrm>
-            <a:off x="1738872" y="1800485"/>
-            <a:ext cx="5890006" cy="4378412"/>
+            <a:off x="1738872" y="1863803"/>
+            <a:ext cx="5890006" cy="4251776"/>
           </a:xfrm>
           <a:prstGeom prst="rect">
             <a:avLst/>
@@ -10812,7 +10759,7 @@
         </p:nvSpPr>
         <p:spPr>
           <a:xfrm rot="16200000">
-            <a:off x="2435517" y="1023900"/>
+            <a:off x="2413235" y="1023900"/>
             <a:ext cx="4679854" cy="5911446"/>
           </a:xfrm>
           <a:prstGeom prst="corner">

</xml_diff>